<commit_message>
Changes in Invitation - added containers (arrays and lists).
</commit_message>
<xml_diff>
--- a/Programming Made Easy - Invitation.pptx
+++ b/Programming Made Easy - Invitation.pptx
@@ -5783,7 +5783,7 @@
           <a:p>
             <a:fld id="{450045EB-F0A2-405F-866B-BCD425706225}" type="datetimeFigureOut">
               <a:rPr lang="en-CA" smtClean="0"/>
-              <a:t>05/09/2012</a:t>
+              <a:t>07/09/2012</a:t>
             </a:fld>
             <a:endParaRPr lang="en-CA"/>
           </a:p>
@@ -6733,11 +6733,7 @@
             <a:pPr algn="ctr"/>
             <a:r>
               <a:rPr lang="pl-PL" dirty="0" smtClean="0"/>
-              <a:t>Programming Made </a:t>
-            </a:r>
-            <a:r>
-              <a:rPr lang="pl-PL" dirty="0" smtClean="0"/>
-              <a:t>Easy</a:t>
+              <a:t>Programming Made Easy</a:t>
             </a:r>
             <a:br>
               <a:rPr lang="pl-PL" dirty="0" smtClean="0"/>
@@ -7193,6 +7189,34 @@
             <a:r>
               <a:rPr lang="pl-PL" dirty="0" smtClean="0"/>
               <a:t>Loops</a:t>
+            </a:r>
+            <a:endParaRPr lang="en-CA" dirty="0"/>
+          </a:p>
+        </p:txBody>
+      </p:sp>
+      <p:sp>
+        <p:nvSpPr>
+          <p:cNvPr id="7" name="Content Placeholder 5"/>
+          <p:cNvSpPr>
+            <a:spLocks noGrp="1"/>
+          </p:cNvSpPr>
+          <p:nvPr>
+            <p:ph sz="quarter" idx="13"/>
+          </p:nvPr>
+        </p:nvSpPr>
+        <p:spPr>
+          <a:xfrm>
+            <a:off x="323528" y="4653136"/>
+            <a:ext cx="3095625" cy="1368425"/>
+          </a:xfrm>
+        </p:spPr>
+        <p:txBody>
+          <a:bodyPr/>
+          <a:lstStyle/>
+          <a:p>
+            <a:r>
+              <a:rPr lang="pl-PL" dirty="0" smtClean="0"/>
+              <a:t>Containers: arrays and lists</a:t>
             </a:r>
             <a:endParaRPr lang="en-CA" dirty="0"/>
           </a:p>

</xml_diff>